<commit_message>
Folie zu Entity Ruler ergänzt.
</commit_message>
<xml_diff>
--- a/Praesentation/Praesentation_Fachpraktikum_MedExtractor_Gruppe5.pptx
+++ b/Praesentation/Praesentation_Fachpraktikum_MedExtractor_Gruppe5.pptx
@@ -11,7 +11,7 @@
     <p:sldMasterId id="2147483726" r:id="rId7"/>
   </p:sldMasterIdLst>
   <p:notesMasterIdLst>
-    <p:notesMasterId r:id="rId20"/>
+    <p:notesMasterId r:id="rId21"/>
   </p:notesMasterIdLst>
   <p:sldIdLst>
     <p:sldId id="256" r:id="rId8"/>
@@ -19,13 +19,14 @@
     <p:sldId id="258" r:id="rId10"/>
     <p:sldId id="259" r:id="rId11"/>
     <p:sldId id="260" r:id="rId12"/>
-    <p:sldId id="261" r:id="rId13"/>
-    <p:sldId id="262" r:id="rId14"/>
-    <p:sldId id="263" r:id="rId15"/>
-    <p:sldId id="264" r:id="rId16"/>
-    <p:sldId id="265" r:id="rId17"/>
-    <p:sldId id="266" r:id="rId18"/>
-    <p:sldId id="267" r:id="rId19"/>
+    <p:sldId id="268" r:id="rId13"/>
+    <p:sldId id="261" r:id="rId14"/>
+    <p:sldId id="262" r:id="rId15"/>
+    <p:sldId id="263" r:id="rId16"/>
+    <p:sldId id="264" r:id="rId17"/>
+    <p:sldId id="265" r:id="rId18"/>
+    <p:sldId id="266" r:id="rId19"/>
+    <p:sldId id="267" r:id="rId20"/>
   </p:sldIdLst>
   <p:sldSz cx="12192000" cy="6858000"/>
   <p:notesSz cx="6858000" cy="9144000"/>
@@ -124,6 +125,11 @@
       </a:defRPr>
     </a:lvl9pPr>
   </p:defaultTextStyle>
+  <p:extLst>
+    <p:ext uri="{EFAFB233-063F-42B5-8137-9DF3F51BA10A}">
+      <p15:sldGuideLst xmlns:p15="http://schemas.microsoft.com/office/powerpoint/2012/main"/>
+    </p:ext>
+  </p:extLst>
 </p:presentation>
 </file>
 
@@ -17765,7 +17771,7 @@
       </p:grpSpPr>
       <p:sp>
         <p:nvSpPr>
-          <p:cNvPr id="376" name="TextShape 1"/>
+          <p:cNvPr id="365" name="TextShape 1"/>
           <p:cNvSpPr txBox="1"/>
           <p:nvPr/>
         </p:nvSpPr>
@@ -17788,18 +17794,32 @@
           </a:bodyPr>
           <a:lstStyle/>
           <a:p>
-            <a:endParaRPr lang="de-DE" sz="1800" b="0" strike="noStrike" spc="-1">
-              <a:solidFill>
-                <a:srgbClr val="000000"/>
-              </a:solidFill>
-              <a:latin typeface="Frutiger LT Com 45 Light"/>
-            </a:endParaRPr>
-          </a:p>
-        </p:txBody>
-      </p:sp>
-      <p:sp>
-        <p:nvSpPr>
-          <p:cNvPr id="377" name="TextShape 2"/>
+            <a:pPr>
+              <a:lnSpc>
+                <a:spcPct val="100000"/>
+              </a:lnSpc>
+            </a:pPr>
+            <a:r>
+              <a:rPr lang="de-DE" sz="2200" b="1" strike="noStrike" spc="-1">
+                <a:solidFill>
+                  <a:srgbClr val="5073A5"/>
+                </a:solidFill>
+                <a:latin typeface="Frutiger LT Com 45 Light"/>
+              </a:rPr>
+              <a:t>Folie mit Agenda</a:t>
+            </a:r>
+            <a:endParaRPr lang="de-DE" sz="2200" b="0" strike="noStrike" spc="-1">
+              <a:solidFill>
+                <a:srgbClr val="000000"/>
+              </a:solidFill>
+              <a:latin typeface="Frutiger LT Com 45 Light"/>
+            </a:endParaRPr>
+          </a:p>
+        </p:txBody>
+      </p:sp>
+      <p:sp>
+        <p:nvSpPr>
+          <p:cNvPr id="366" name="TextShape 2"/>
           <p:cNvSpPr txBox="1"/>
           <p:nvPr/>
         </p:nvSpPr>
@@ -17833,7 +17853,7 @@
       </p:sp>
       <p:sp>
         <p:nvSpPr>
-          <p:cNvPr id="378" name="TextShape 3"/>
+          <p:cNvPr id="367" name="TextShape 3"/>
           <p:cNvSpPr txBox="1"/>
           <p:nvPr/>
         </p:nvSpPr>
@@ -17878,6 +17898,549 @@
       </p:sp>
       <p:sp>
         <p:nvSpPr>
+          <p:cNvPr id="368" name="TextShape 4"/>
+          <p:cNvSpPr txBox="1"/>
+          <p:nvPr/>
+        </p:nvSpPr>
+        <p:spPr>
+          <a:xfrm>
+            <a:off x="1055520" y="6426000"/>
+            <a:ext cx="553320" cy="240480"/>
+          </a:xfrm>
+          <a:prstGeom prst="rect">
+            <a:avLst/>
+          </a:prstGeom>
+          <a:noFill/>
+          <a:ln w="0">
+            <a:noFill/>
+          </a:ln>
+        </p:spPr>
+        <p:txBody>
+          <a:bodyPr lIns="0" tIns="0" rIns="0" bIns="0">
+            <a:noAutofit/>
+          </a:bodyPr>
+          <a:lstStyle/>
+          <a:p>
+            <a:pPr>
+              <a:lnSpc>
+                <a:spcPct val="100000"/>
+              </a:lnSpc>
+            </a:pPr>
+            <a:fld id="{564F56BD-C8EE-4DE2-BD40-0964940A191E}" type="slidenum">
+              <a:rPr lang="de-DE" sz="900" b="1" strike="noStrike" spc="-1">
+                <a:solidFill>
+                  <a:srgbClr val="5073A5"/>
+                </a:solidFill>
+                <a:latin typeface="Frutiger LT Com 45 Light"/>
+              </a:rPr>
+              <a:t>10</a:t>
+            </a:fld>
+            <a:endParaRPr lang="de-DE" sz="900" b="0" strike="noStrike" spc="-1">
+              <a:latin typeface="Times New Roman"/>
+            </a:endParaRPr>
+          </a:p>
+        </p:txBody>
+      </p:sp>
+      <p:sp>
+        <p:nvSpPr>
+          <p:cNvPr id="369" name="CustomShape 5"/>
+          <p:cNvSpPr/>
+          <p:nvPr/>
+        </p:nvSpPr>
+        <p:spPr>
+          <a:xfrm>
+            <a:off x="1032480" y="1087560"/>
+            <a:ext cx="2495520" cy="272880"/>
+          </a:xfrm>
+          <a:prstGeom prst="rect">
+            <a:avLst/>
+          </a:prstGeom>
+          <a:noFill/>
+          <a:ln w="0">
+            <a:noFill/>
+          </a:ln>
+        </p:spPr>
+        <p:style>
+          <a:lnRef idx="0">
+            <a:scrgbClr r="0" g="0" b="0"/>
+          </a:lnRef>
+          <a:fillRef idx="0">
+            <a:scrgbClr r="0" g="0" b="0"/>
+          </a:fillRef>
+          <a:effectRef idx="0">
+            <a:scrgbClr r="0" g="0" b="0"/>
+          </a:effectRef>
+          <a:fontRef idx="minor"/>
+        </p:style>
+        <p:txBody>
+          <a:bodyPr lIns="90000" tIns="45000" rIns="90000" bIns="45000">
+            <a:spAutoFit/>
+          </a:bodyPr>
+          <a:lstStyle/>
+          <a:p>
+            <a:pPr algn="ctr">
+              <a:lnSpc>
+                <a:spcPct val="100000"/>
+              </a:lnSpc>
+            </a:pPr>
+            <a:r>
+              <a:rPr lang="de-DE" sz="1200" b="0" strike="noStrike" spc="-1">
+                <a:solidFill>
+                  <a:srgbClr val="000000"/>
+                </a:solidFill>
+                <a:latin typeface="Frutiger LT Com 45 Light"/>
+              </a:rPr>
+              <a:t>Thema 1</a:t>
+            </a:r>
+            <a:endParaRPr lang="de-DE" sz="1200" b="0" strike="noStrike" spc="-1">
+              <a:latin typeface="Arial"/>
+            </a:endParaRPr>
+          </a:p>
+        </p:txBody>
+      </p:sp>
+      <p:sp>
+        <p:nvSpPr>
+          <p:cNvPr id="370" name="CustomShape 6"/>
+          <p:cNvSpPr/>
+          <p:nvPr/>
+        </p:nvSpPr>
+        <p:spPr>
+          <a:xfrm>
+            <a:off x="3529080" y="1072080"/>
+            <a:ext cx="1631160" cy="272880"/>
+          </a:xfrm>
+          <a:prstGeom prst="rect">
+            <a:avLst/>
+          </a:prstGeom>
+          <a:noFill/>
+          <a:ln w="0">
+            <a:noFill/>
+          </a:ln>
+        </p:spPr>
+        <p:style>
+          <a:lnRef idx="0">
+            <a:scrgbClr r="0" g="0" b="0"/>
+          </a:lnRef>
+          <a:fillRef idx="0">
+            <a:scrgbClr r="0" g="0" b="0"/>
+          </a:fillRef>
+          <a:effectRef idx="0">
+            <a:scrgbClr r="0" g="0" b="0"/>
+          </a:effectRef>
+          <a:fontRef idx="minor"/>
+        </p:style>
+        <p:txBody>
+          <a:bodyPr lIns="90000" tIns="45000" rIns="90000" bIns="45000">
+            <a:spAutoFit/>
+          </a:bodyPr>
+          <a:lstStyle/>
+          <a:p>
+            <a:pPr algn="ctr">
+              <a:lnSpc>
+                <a:spcPct val="100000"/>
+              </a:lnSpc>
+            </a:pPr>
+            <a:r>
+              <a:rPr lang="de-DE" sz="1200" b="0" strike="noStrike" spc="-1">
+                <a:solidFill>
+                  <a:srgbClr val="B1B3B3"/>
+                </a:solidFill>
+                <a:latin typeface="Frutiger LT Com 45 Light"/>
+              </a:rPr>
+              <a:t>Aspekt 1</a:t>
+            </a:r>
+            <a:endParaRPr lang="de-DE" sz="1200" b="0" strike="noStrike" spc="-1">
+              <a:latin typeface="Arial"/>
+            </a:endParaRPr>
+          </a:p>
+        </p:txBody>
+      </p:sp>
+      <p:sp>
+        <p:nvSpPr>
+          <p:cNvPr id="371" name="CustomShape 7"/>
+          <p:cNvSpPr/>
+          <p:nvPr/>
+        </p:nvSpPr>
+        <p:spPr>
+          <a:xfrm>
+            <a:off x="5313240" y="1087560"/>
+            <a:ext cx="1383840" cy="272880"/>
+          </a:xfrm>
+          <a:prstGeom prst="rect">
+            <a:avLst/>
+          </a:prstGeom>
+          <a:noFill/>
+          <a:ln w="0">
+            <a:noFill/>
+          </a:ln>
+        </p:spPr>
+        <p:style>
+          <a:lnRef idx="0">
+            <a:scrgbClr r="0" g="0" b="0"/>
+          </a:lnRef>
+          <a:fillRef idx="0">
+            <a:scrgbClr r="0" g="0" b="0"/>
+          </a:fillRef>
+          <a:effectRef idx="0">
+            <a:scrgbClr r="0" g="0" b="0"/>
+          </a:effectRef>
+          <a:fontRef idx="minor"/>
+        </p:style>
+        <p:txBody>
+          <a:bodyPr lIns="90000" tIns="45000" rIns="90000" bIns="45000">
+            <a:spAutoFit/>
+          </a:bodyPr>
+          <a:lstStyle/>
+          <a:p>
+            <a:pPr>
+              <a:lnSpc>
+                <a:spcPct val="100000"/>
+              </a:lnSpc>
+            </a:pPr>
+            <a:r>
+              <a:rPr lang="de-DE" sz="1200" b="0" strike="noStrike" spc="-1">
+                <a:solidFill>
+                  <a:srgbClr val="B1B3B3"/>
+                </a:solidFill>
+                <a:latin typeface="Frutiger LT Com 45 Light"/>
+              </a:rPr>
+              <a:t>Aspekt 2</a:t>
+            </a:r>
+            <a:endParaRPr lang="de-DE" sz="1200" b="0" strike="noStrike" spc="-1">
+              <a:latin typeface="Arial"/>
+            </a:endParaRPr>
+          </a:p>
+        </p:txBody>
+      </p:sp>
+      <p:sp>
+        <p:nvSpPr>
+          <p:cNvPr id="372" name="CustomShape 8"/>
+          <p:cNvSpPr/>
+          <p:nvPr/>
+        </p:nvSpPr>
+        <p:spPr>
+          <a:xfrm>
+            <a:off x="8460000" y="1082880"/>
+            <a:ext cx="2172240" cy="272880"/>
+          </a:xfrm>
+          <a:prstGeom prst="rect">
+            <a:avLst/>
+          </a:prstGeom>
+          <a:noFill/>
+          <a:ln w="0">
+            <a:noFill/>
+          </a:ln>
+        </p:spPr>
+        <p:style>
+          <a:lnRef idx="0">
+            <a:scrgbClr r="0" g="0" b="0"/>
+          </a:lnRef>
+          <a:fillRef idx="0">
+            <a:scrgbClr r="0" g="0" b="0"/>
+          </a:fillRef>
+          <a:effectRef idx="0">
+            <a:scrgbClr r="0" g="0" b="0"/>
+          </a:effectRef>
+          <a:fontRef idx="minor"/>
+        </p:style>
+        <p:txBody>
+          <a:bodyPr lIns="90000" tIns="45000" rIns="90000" bIns="45000">
+            <a:spAutoFit/>
+          </a:bodyPr>
+          <a:lstStyle/>
+          <a:p>
+            <a:pPr algn="ctr">
+              <a:lnSpc>
+                <a:spcPct val="100000"/>
+              </a:lnSpc>
+            </a:pPr>
+            <a:r>
+              <a:rPr lang="de-DE" sz="1200" b="0" strike="noStrike" spc="-1">
+                <a:solidFill>
+                  <a:srgbClr val="B1B3B3"/>
+                </a:solidFill>
+                <a:latin typeface="Frutiger LT Com 45 Light"/>
+              </a:rPr>
+              <a:t>Thema 3</a:t>
+            </a:r>
+            <a:endParaRPr lang="de-DE" sz="1200" b="0" strike="noStrike" spc="-1">
+              <a:latin typeface="Arial"/>
+            </a:endParaRPr>
+          </a:p>
+        </p:txBody>
+      </p:sp>
+      <p:sp>
+        <p:nvSpPr>
+          <p:cNvPr id="373" name="Line 9"/>
+          <p:cNvSpPr/>
+          <p:nvPr/>
+        </p:nvSpPr>
+        <p:spPr>
+          <a:xfrm>
+            <a:off x="1079640" y="1395000"/>
+            <a:ext cx="9840600" cy="0"/>
+          </a:xfrm>
+          <a:prstGeom prst="line">
+            <a:avLst/>
+          </a:prstGeom>
+          <a:ln>
+            <a:solidFill>
+              <a:srgbClr val="000000"/>
+            </a:solidFill>
+            <a:round/>
+          </a:ln>
+        </p:spPr>
+        <p:style>
+          <a:lnRef idx="1">
+            <a:schemeClr val="dk1"/>
+          </a:lnRef>
+          <a:fillRef idx="0">
+            <a:schemeClr val="dk1"/>
+          </a:fillRef>
+          <a:effectRef idx="0">
+            <a:schemeClr val="dk1"/>
+          </a:effectRef>
+          <a:fontRef idx="minor"/>
+        </p:style>
+      </p:sp>
+      <p:sp>
+        <p:nvSpPr>
+          <p:cNvPr id="374" name="CustomShape 10"/>
+          <p:cNvSpPr/>
+          <p:nvPr/>
+        </p:nvSpPr>
+        <p:spPr>
+          <a:xfrm>
+            <a:off x="6876360" y="1072080"/>
+            <a:ext cx="1383840" cy="272880"/>
+          </a:xfrm>
+          <a:prstGeom prst="rect">
+            <a:avLst/>
+          </a:prstGeom>
+          <a:noFill/>
+          <a:ln w="0">
+            <a:noFill/>
+          </a:ln>
+        </p:spPr>
+        <p:style>
+          <a:lnRef idx="0">
+            <a:scrgbClr r="0" g="0" b="0"/>
+          </a:lnRef>
+          <a:fillRef idx="0">
+            <a:scrgbClr r="0" g="0" b="0"/>
+          </a:fillRef>
+          <a:effectRef idx="0">
+            <a:scrgbClr r="0" g="0" b="0"/>
+          </a:effectRef>
+          <a:fontRef idx="minor"/>
+        </p:style>
+        <p:txBody>
+          <a:bodyPr lIns="90000" tIns="45000" rIns="90000" bIns="45000">
+            <a:spAutoFit/>
+          </a:bodyPr>
+          <a:lstStyle/>
+          <a:p>
+            <a:pPr>
+              <a:lnSpc>
+                <a:spcPct val="100000"/>
+              </a:lnSpc>
+            </a:pPr>
+            <a:r>
+              <a:rPr lang="de-DE" sz="1200" b="0" strike="noStrike" spc="-1">
+                <a:solidFill>
+                  <a:srgbClr val="B1B3B3"/>
+                </a:solidFill>
+                <a:latin typeface="Frutiger LT Com 45 Light"/>
+              </a:rPr>
+              <a:t>Aspekt 3</a:t>
+            </a:r>
+            <a:endParaRPr lang="de-DE" sz="1200" b="0" strike="noStrike" spc="-1">
+              <a:latin typeface="Arial"/>
+            </a:endParaRPr>
+          </a:p>
+        </p:txBody>
+      </p:sp>
+      <p:sp>
+        <p:nvSpPr>
+          <p:cNvPr id="375" name="CustomShape 11"/>
+          <p:cNvSpPr/>
+          <p:nvPr/>
+        </p:nvSpPr>
+        <p:spPr>
+          <a:xfrm>
+            <a:off x="1944000" y="1316520"/>
+            <a:ext cx="143640" cy="126000"/>
+          </a:xfrm>
+          <a:prstGeom prst="triangle">
+            <a:avLst>
+              <a:gd name="adj" fmla="val 50000"/>
+            </a:avLst>
+          </a:prstGeom>
+          <a:solidFill>
+            <a:srgbClr val="000000"/>
+          </a:solidFill>
+          <a:ln>
+            <a:noFill/>
+          </a:ln>
+        </p:spPr>
+        <p:style>
+          <a:lnRef idx="2">
+            <a:schemeClr val="dk1">
+              <a:shade val="50000"/>
+            </a:schemeClr>
+          </a:lnRef>
+          <a:fillRef idx="1">
+            <a:schemeClr val="dk1"/>
+          </a:fillRef>
+          <a:effectRef idx="0">
+            <a:schemeClr val="dk1"/>
+          </a:effectRef>
+          <a:fontRef idx="minor"/>
+        </p:style>
+      </p:sp>
+    </p:spTree>
+  </p:cSld>
+  <p:clrMapOvr>
+    <a:masterClrMapping/>
+  </p:clrMapOvr>
+  <p:transition spd="slow">
+    <p:fade/>
+  </p:transition>
+</p:sld>
+</file>
+
+<file path=ppt/slides/slide11.xml><?xml version="1.0" encoding="utf-8"?>
+<p:sld xmlns:a="http://schemas.openxmlformats.org/drawingml/2006/main" xmlns:r="http://schemas.openxmlformats.org/officeDocument/2006/relationships" xmlns:p="http://schemas.openxmlformats.org/presentationml/2006/main">
+  <p:cSld>
+    <p:spTree>
+      <p:nvGrpSpPr>
+        <p:cNvPr id="1" name=""/>
+        <p:cNvGrpSpPr/>
+        <p:nvPr/>
+      </p:nvGrpSpPr>
+      <p:grpSpPr>
+        <a:xfrm>
+          <a:off x="0" y="0"/>
+          <a:ext cx="0" cy="0"/>
+          <a:chOff x="0" y="0"/>
+          <a:chExt cx="0" cy="0"/>
+        </a:xfrm>
+      </p:grpSpPr>
+      <p:sp>
+        <p:nvSpPr>
+          <p:cNvPr id="376" name="TextShape 1"/>
+          <p:cNvSpPr txBox="1"/>
+          <p:nvPr/>
+        </p:nvSpPr>
+        <p:spPr>
+          <a:xfrm>
+            <a:off x="720000" y="260640"/>
+            <a:ext cx="8183880" cy="661680"/>
+          </a:xfrm>
+          <a:prstGeom prst="rect">
+            <a:avLst/>
+          </a:prstGeom>
+          <a:noFill/>
+          <a:ln w="0">
+            <a:noFill/>
+          </a:ln>
+        </p:spPr>
+        <p:txBody>
+          <a:bodyPr lIns="0" tIns="0" rIns="0" bIns="0" anchor="b">
+            <a:noAutofit/>
+          </a:bodyPr>
+          <a:lstStyle/>
+          <a:p>
+            <a:endParaRPr lang="de-DE" sz="1800" b="0" strike="noStrike" spc="-1">
+              <a:solidFill>
+                <a:srgbClr val="000000"/>
+              </a:solidFill>
+              <a:latin typeface="Frutiger LT Com 45 Light"/>
+            </a:endParaRPr>
+          </a:p>
+        </p:txBody>
+      </p:sp>
+      <p:sp>
+        <p:nvSpPr>
+          <p:cNvPr id="377" name="TextShape 2"/>
+          <p:cNvSpPr txBox="1"/>
+          <p:nvPr/>
+        </p:nvSpPr>
+        <p:spPr>
+          <a:xfrm>
+            <a:off x="715680" y="1700640"/>
+            <a:ext cx="10803960" cy="4320000"/>
+          </a:xfrm>
+          <a:prstGeom prst="rect">
+            <a:avLst/>
+          </a:prstGeom>
+          <a:noFill/>
+          <a:ln w="0">
+            <a:noFill/>
+          </a:ln>
+        </p:spPr>
+        <p:txBody>
+          <a:bodyPr lIns="0" tIns="0" rIns="0" bIns="0">
+            <a:noAutofit/>
+          </a:bodyPr>
+          <a:lstStyle/>
+          <a:p>
+            <a:endParaRPr lang="de-DE" sz="1700" b="0" strike="noStrike" spc="-1">
+              <a:solidFill>
+                <a:srgbClr val="000000"/>
+              </a:solidFill>
+              <a:latin typeface="Frutiger LT Com 45 Light"/>
+            </a:endParaRPr>
+          </a:p>
+        </p:txBody>
+      </p:sp>
+      <p:sp>
+        <p:nvSpPr>
+          <p:cNvPr id="378" name="TextShape 3"/>
+          <p:cNvSpPr txBox="1"/>
+          <p:nvPr/>
+        </p:nvSpPr>
+        <p:spPr>
+          <a:xfrm>
+            <a:off x="1631520" y="6426000"/>
+            <a:ext cx="7272360" cy="240480"/>
+          </a:xfrm>
+          <a:prstGeom prst="rect">
+            <a:avLst/>
+          </a:prstGeom>
+          <a:noFill/>
+          <a:ln w="0">
+            <a:noFill/>
+          </a:ln>
+        </p:spPr>
+        <p:txBody>
+          <a:bodyPr lIns="0" tIns="0" rIns="0" bIns="0">
+            <a:noAutofit/>
+          </a:bodyPr>
+          <a:lstStyle/>
+          <a:p>
+            <a:pPr>
+              <a:lnSpc>
+                <a:spcPct val="100000"/>
+              </a:lnSpc>
+            </a:pPr>
+            <a:r>
+              <a:rPr lang="en-US" sz="900" b="0" strike="noStrike" spc="-1">
+                <a:solidFill>
+                  <a:srgbClr val="5073A5"/>
+                </a:solidFill>
+                <a:latin typeface="Frutiger LT Com 45 Light"/>
+              </a:rPr>
+              <a:t>Fußzeile</a:t>
+            </a:r>
+            <a:endParaRPr lang="de-DE" sz="900" b="0" strike="noStrike" spc="-1">
+              <a:latin typeface="Times New Roman"/>
+            </a:endParaRPr>
+          </a:p>
+        </p:txBody>
+      </p:sp>
+      <p:sp>
+        <p:nvSpPr>
           <p:cNvPr id="379" name="TextShape 4"/>
           <p:cNvSpPr txBox="1"/>
           <p:nvPr/>
@@ -17913,7 +18476,7 @@
                 </a:solidFill>
                 <a:latin typeface="Frutiger LT Com 45 Light"/>
               </a:rPr>
-              <a:t>10</a:t>
+              <a:t>11</a:t>
             </a:fld>
             <a:endParaRPr lang="de-DE" sz="900" b="0" strike="noStrike" spc="-1">
               <a:latin typeface="Times New Roman"/>
@@ -17929,7 +18492,7 @@
 </p:sld>
 </file>
 
-<file path=ppt/slides/slide11.xml><?xml version="1.0" encoding="utf-8"?>
+<file path=ppt/slides/slide12.xml><?xml version="1.0" encoding="utf-8"?>
 <p:sld xmlns:a="http://schemas.openxmlformats.org/drawingml/2006/main" xmlns:r="http://schemas.openxmlformats.org/officeDocument/2006/relationships" xmlns:p="http://schemas.openxmlformats.org/presentationml/2006/main">
   <p:cSld>
     <p:spTree>
@@ -18443,7 +19006,7 @@
 </p:sld>
 </file>
 
-<file path=ppt/slides/slide12.xml><?xml version="1.0" encoding="utf-8"?>
+<file path=ppt/slides/slide13.xml><?xml version="1.0" encoding="utf-8"?>
 <p:sld xmlns:a="http://schemas.openxmlformats.org/drawingml/2006/main" xmlns:r="http://schemas.openxmlformats.org/officeDocument/2006/relationships" xmlns:p="http://schemas.openxmlformats.org/presentationml/2006/main">
   <p:cSld>
     <p:spTree>
@@ -19745,7 +20308,7 @@
               </a:lnSpc>
             </a:pPr>
             <a:r>
-              <a:rPr lang="de-DE" sz="2200" b="1" strike="noStrike" spc="-1">
+              <a:rPr lang="de-DE" sz="2200" b="1" strike="noStrike" spc="-1" dirty="0">
                 <a:solidFill>
                   <a:srgbClr val="5073A5"/>
                 </a:solidFill>
@@ -19753,7 +20316,7 @@
               </a:rPr>
               <a:t>Lösungsansatz</a:t>
             </a:r>
-            <a:endParaRPr lang="de-DE" sz="2200" b="0" strike="noStrike" spc="-1">
+            <a:endParaRPr lang="de-DE" sz="2200" b="0" strike="noStrike" spc="-1" dirty="0">
               <a:solidFill>
                 <a:srgbClr val="000000"/>
               </a:solidFill>
@@ -20237,6 +20800,143 @@
       </p:grpSpPr>
       <p:sp>
         <p:nvSpPr>
+          <p:cNvPr id="2" name="Titel 1">
+            <a:extLst>
+              <a:ext uri="{FF2B5EF4-FFF2-40B4-BE49-F238E27FC236}">
+                <a16:creationId xmlns:a16="http://schemas.microsoft.com/office/drawing/2014/main" id="{8CF02375-252A-474D-5D8C-B488BB93DC2F}"/>
+              </a:ext>
+            </a:extLst>
+          </p:cNvPr>
+          <p:cNvSpPr>
+            <a:spLocks noGrp="1"/>
+          </p:cNvSpPr>
+          <p:nvPr>
+            <p:ph type="title"/>
+          </p:nvPr>
+        </p:nvSpPr>
+        <p:spPr>
+          <a:noFill/>
+          <a:ln w="0">
+            <a:noFill/>
+          </a:ln>
+        </p:spPr>
+        <p:txBody>
+          <a:bodyPr lIns="0" tIns="0" rIns="0" bIns="0" anchor="b">
+            <a:noAutofit/>
+          </a:bodyPr>
+          <a:lstStyle/>
+          <a:p>
+            <a:pPr>
+              <a:lnSpc>
+                <a:spcPct val="100000"/>
+              </a:lnSpc>
+            </a:pPr>
+            <a:r>
+              <a:rPr lang="de-DE" sz="2200" b="1" spc="-1" dirty="0" err="1">
+                <a:solidFill>
+                  <a:srgbClr val="5073A5"/>
+                </a:solidFill>
+                <a:latin typeface="Frutiger LT Com 45 Light"/>
+                <a:ea typeface="+mn-ea"/>
+                <a:cs typeface="+mn-cs"/>
+              </a:rPr>
+              <a:t>SpaCy‘s</a:t>
+            </a:r>
+            <a:r>
+              <a:rPr lang="de-DE" sz="2200" b="1" spc="-1" dirty="0">
+                <a:solidFill>
+                  <a:srgbClr val="5073A5"/>
+                </a:solidFill>
+                <a:latin typeface="Frutiger LT Com 45 Light"/>
+                <a:ea typeface="+mn-ea"/>
+                <a:cs typeface="+mn-cs"/>
+              </a:rPr>
+              <a:t> Entity </a:t>
+            </a:r>
+            <a:r>
+              <a:rPr lang="de-DE" sz="2200" b="1" spc="-1" dirty="0" err="1">
+                <a:solidFill>
+                  <a:srgbClr val="5073A5"/>
+                </a:solidFill>
+                <a:latin typeface="Frutiger LT Com 45 Light"/>
+                <a:ea typeface="+mn-ea"/>
+                <a:cs typeface="+mn-cs"/>
+              </a:rPr>
+              <a:t>Ruler</a:t>
+            </a:r>
+            <a:endParaRPr lang="de-DE" sz="2200" b="1" spc="-1" dirty="0">
+              <a:solidFill>
+                <a:srgbClr val="5073A5"/>
+              </a:solidFill>
+              <a:latin typeface="Frutiger LT Com 45 Light"/>
+              <a:ea typeface="+mn-ea"/>
+              <a:cs typeface="+mn-cs"/>
+            </a:endParaRPr>
+          </a:p>
+        </p:txBody>
+      </p:sp>
+      <p:pic>
+        <p:nvPicPr>
+          <p:cNvPr id="9" name="Grafik 8">
+            <a:extLst>
+              <a:ext uri="{FF2B5EF4-FFF2-40B4-BE49-F238E27FC236}">
+                <a16:creationId xmlns:a16="http://schemas.microsoft.com/office/drawing/2014/main" id="{6E70C3E0-E250-BC0E-AA4E-2B892EC74546}"/>
+              </a:ext>
+            </a:extLst>
+          </p:cNvPr>
+          <p:cNvPicPr>
+            <a:picLocks noChangeAspect="1"/>
+          </p:cNvPicPr>
+          <p:nvPr/>
+        </p:nvPicPr>
+        <p:blipFill>
+          <a:blip r:embed="rId2"/>
+          <a:stretch>
+            <a:fillRect/>
+          </a:stretch>
+        </p:blipFill>
+        <p:spPr>
+          <a:xfrm>
+            <a:off x="731280" y="1463599"/>
+            <a:ext cx="10729439" cy="4320751"/>
+          </a:xfrm>
+          <a:prstGeom prst="rect">
+            <a:avLst/>
+          </a:prstGeom>
+        </p:spPr>
+      </p:pic>
+    </p:spTree>
+    <p:extLst>
+      <p:ext uri="{BB962C8B-B14F-4D97-AF65-F5344CB8AC3E}">
+        <p14:creationId xmlns:p14="http://schemas.microsoft.com/office/powerpoint/2010/main" val="668240872"/>
+      </p:ext>
+    </p:extLst>
+  </p:cSld>
+  <p:clrMapOvr>
+    <a:masterClrMapping/>
+  </p:clrMapOvr>
+</p:sld>
+</file>
+
+<file path=ppt/slides/slide7.xml><?xml version="1.0" encoding="utf-8"?>
+<p:sld xmlns:a="http://schemas.openxmlformats.org/drawingml/2006/main" xmlns:r="http://schemas.openxmlformats.org/officeDocument/2006/relationships" xmlns:p="http://schemas.openxmlformats.org/presentationml/2006/main">
+  <p:cSld>
+    <p:spTree>
+      <p:nvGrpSpPr>
+        <p:cNvPr id="1" name=""/>
+        <p:cNvGrpSpPr/>
+        <p:nvPr/>
+      </p:nvGrpSpPr>
+      <p:grpSpPr>
+        <a:xfrm>
+          <a:off x="0" y="0"/>
+          <a:ext cx="0" cy="0"/>
+          <a:chOff x="0" y="0"/>
+          <a:chExt cx="0" cy="0"/>
+        </a:xfrm>
+      </p:grpSpPr>
+      <p:sp>
+        <p:nvSpPr>
           <p:cNvPr id="356" name="TextShape 1"/>
           <p:cNvSpPr txBox="1"/>
           <p:nvPr/>
@@ -20317,7 +21017,7 @@
                 </a:solidFill>
                 <a:latin typeface="Frutiger LT Com 45 Light"/>
               </a:rPr>
-              <a:t>6</a:t>
+              <a:t>7</a:t>
             </a:fld>
             <a:endParaRPr lang="de-DE" sz="900" b="0" strike="noStrike" spc="-1">
               <a:latin typeface="Times New Roman"/>
@@ -20417,169 +21117,6 @@
 </p:sld>
 </file>
 
-<file path=ppt/slides/slide7.xml><?xml version="1.0" encoding="utf-8"?>
-<p:sld xmlns:a="http://schemas.openxmlformats.org/drawingml/2006/main" xmlns:r="http://schemas.openxmlformats.org/officeDocument/2006/relationships" xmlns:p="http://schemas.openxmlformats.org/presentationml/2006/main">
-  <p:cSld>
-    <p:spTree>
-      <p:nvGrpSpPr>
-        <p:cNvPr id="1" name=""/>
-        <p:cNvGrpSpPr/>
-        <p:nvPr/>
-      </p:nvGrpSpPr>
-      <p:grpSpPr>
-        <a:xfrm>
-          <a:off x="0" y="0"/>
-          <a:ext cx="0" cy="0"/>
-          <a:chOff x="0" y="0"/>
-          <a:chExt cx="0" cy="0"/>
-        </a:xfrm>
-      </p:grpSpPr>
-      <p:sp>
-        <p:nvSpPr>
-          <p:cNvPr id="359" name="TextShape 1"/>
-          <p:cNvSpPr txBox="1"/>
-          <p:nvPr/>
-        </p:nvSpPr>
-        <p:spPr>
-          <a:xfrm>
-            <a:off x="1631520" y="6426000"/>
-            <a:ext cx="7272360" cy="240480"/>
-          </a:xfrm>
-          <a:prstGeom prst="rect">
-            <a:avLst/>
-          </a:prstGeom>
-          <a:noFill/>
-          <a:ln w="0">
-            <a:noFill/>
-          </a:ln>
-        </p:spPr>
-        <p:txBody>
-          <a:bodyPr lIns="0" tIns="0" rIns="0" bIns="0">
-            <a:noAutofit/>
-          </a:bodyPr>
-          <a:lstStyle/>
-          <a:p>
-            <a:pPr>
-              <a:lnSpc>
-                <a:spcPct val="100000"/>
-              </a:lnSpc>
-            </a:pPr>
-            <a:r>
-              <a:rPr lang="en-US" sz="900" b="0" strike="noStrike" spc="-1">
-                <a:solidFill>
-                  <a:srgbClr val="5073A5"/>
-                </a:solidFill>
-                <a:latin typeface="Frutiger LT Com 45 Light"/>
-              </a:rPr>
-              <a:t>Fußzeile</a:t>
-            </a:r>
-            <a:endParaRPr lang="de-DE" sz="900" b="0" strike="noStrike" spc="-1">
-              <a:latin typeface="Times New Roman"/>
-            </a:endParaRPr>
-          </a:p>
-        </p:txBody>
-      </p:sp>
-      <p:sp>
-        <p:nvSpPr>
-          <p:cNvPr id="360" name="TextShape 2"/>
-          <p:cNvSpPr txBox="1"/>
-          <p:nvPr/>
-        </p:nvSpPr>
-        <p:spPr>
-          <a:xfrm>
-            <a:off x="1055520" y="6426000"/>
-            <a:ext cx="553320" cy="240480"/>
-          </a:xfrm>
-          <a:prstGeom prst="rect">
-            <a:avLst/>
-          </a:prstGeom>
-          <a:noFill/>
-          <a:ln w="0">
-            <a:noFill/>
-          </a:ln>
-        </p:spPr>
-        <p:txBody>
-          <a:bodyPr lIns="0" tIns="0" rIns="0" bIns="0">
-            <a:noAutofit/>
-          </a:bodyPr>
-          <a:lstStyle/>
-          <a:p>
-            <a:pPr>
-              <a:lnSpc>
-                <a:spcPct val="100000"/>
-              </a:lnSpc>
-            </a:pPr>
-            <a:fld id="{810E913F-87BD-4844-914F-489A9B4C1696}" type="slidenum">
-              <a:rPr lang="de-DE" sz="900" b="1" strike="noStrike" spc="-1">
-                <a:solidFill>
-                  <a:srgbClr val="5073A5"/>
-                </a:solidFill>
-                <a:latin typeface="Frutiger LT Com 45 Light"/>
-              </a:rPr>
-              <a:t>7</a:t>
-            </a:fld>
-            <a:endParaRPr lang="de-DE" sz="900" b="0" strike="noStrike" spc="-1">
-              <a:latin typeface="Times New Roman"/>
-            </a:endParaRPr>
-          </a:p>
-        </p:txBody>
-      </p:sp>
-      <p:sp>
-        <p:nvSpPr>
-          <p:cNvPr id="361" name="TextShape 3"/>
-          <p:cNvSpPr txBox="1"/>
-          <p:nvPr/>
-        </p:nvSpPr>
-        <p:spPr>
-          <a:xfrm>
-            <a:off x="720000" y="260640"/>
-            <a:ext cx="8183880" cy="661680"/>
-          </a:xfrm>
-          <a:prstGeom prst="rect">
-            <a:avLst/>
-          </a:prstGeom>
-          <a:noFill/>
-          <a:ln w="0">
-            <a:noFill/>
-          </a:ln>
-        </p:spPr>
-        <p:txBody>
-          <a:bodyPr lIns="0" tIns="0" rIns="0" bIns="0" anchor="b">
-            <a:noAutofit/>
-          </a:bodyPr>
-          <a:lstStyle/>
-          <a:p>
-            <a:pPr>
-              <a:lnSpc>
-                <a:spcPct val="100000"/>
-              </a:lnSpc>
-            </a:pPr>
-            <a:r>
-              <a:rPr lang="de-DE" sz="2200" b="1" strike="noStrike" spc="-1">
-                <a:solidFill>
-                  <a:srgbClr val="5073A5"/>
-                </a:solidFill>
-                <a:latin typeface="Frutiger LT Com 45 Light"/>
-              </a:rPr>
-              <a:t>Evaluation</a:t>
-            </a:r>
-            <a:endParaRPr lang="de-DE" sz="2200" b="0" strike="noStrike" spc="-1">
-              <a:solidFill>
-                <a:srgbClr val="000000"/>
-              </a:solidFill>
-              <a:latin typeface="Frutiger LT Com 45 Light"/>
-            </a:endParaRPr>
-          </a:p>
-        </p:txBody>
-      </p:sp>
-    </p:spTree>
-  </p:cSld>
-  <p:clrMapOvr>
-    <a:masterClrMapping/>
-  </p:clrMapOvr>
-</p:sld>
-</file>
-
 <file path=ppt/slides/slide8.xml><?xml version="1.0" encoding="utf-8"?>
 <p:sld xmlns:a="http://schemas.openxmlformats.org/drawingml/2006/main" xmlns:r="http://schemas.openxmlformats.org/officeDocument/2006/relationships" xmlns:p="http://schemas.openxmlformats.org/presentationml/2006/main">
   <p:cSld>
@@ -20599,7 +21136,7 @@
       </p:grpSpPr>
       <p:sp>
         <p:nvSpPr>
-          <p:cNvPr id="362" name="TextShape 1"/>
+          <p:cNvPr id="359" name="TextShape 1"/>
           <p:cNvSpPr txBox="1"/>
           <p:nvPr/>
         </p:nvSpPr>
@@ -20644,7 +21181,7 @@
       </p:sp>
       <p:sp>
         <p:nvSpPr>
-          <p:cNvPr id="363" name="TextShape 2"/>
+          <p:cNvPr id="360" name="TextShape 2"/>
           <p:cNvSpPr txBox="1"/>
           <p:nvPr/>
         </p:nvSpPr>
@@ -20672,7 +21209,7 @@
                 <a:spcPct val="100000"/>
               </a:lnSpc>
             </a:pPr>
-            <a:fld id="{B3AA2393-6CAD-47F5-B2B4-97C89E117396}" type="slidenum">
+            <a:fld id="{810E913F-87BD-4844-914F-489A9B4C1696}" type="slidenum">
               <a:rPr lang="de-DE" sz="900" b="1" strike="noStrike" spc="-1">
                 <a:solidFill>
                   <a:srgbClr val="5073A5"/>
@@ -20689,7 +21226,7 @@
       </p:sp>
       <p:sp>
         <p:nvSpPr>
-          <p:cNvPr id="364" name="TextShape 3"/>
+          <p:cNvPr id="361" name="TextShape 3"/>
           <p:cNvSpPr txBox="1"/>
           <p:nvPr/>
         </p:nvSpPr>
@@ -20724,7 +21261,7 @@
                 </a:solidFill>
                 <a:latin typeface="Frutiger LT Com 45 Light"/>
               </a:rPr>
-              <a:t>Zusammenfassung</a:t>
+              <a:t>Evaluation</a:t>
             </a:r>
             <a:endParaRPr lang="de-DE" sz="2200" b="0" strike="noStrike" spc="-1">
               <a:solidFill>
@@ -20762,89 +21299,7 @@
       </p:grpSpPr>
       <p:sp>
         <p:nvSpPr>
-          <p:cNvPr id="365" name="TextShape 1"/>
-          <p:cNvSpPr txBox="1"/>
-          <p:nvPr/>
-        </p:nvSpPr>
-        <p:spPr>
-          <a:xfrm>
-            <a:off x="720000" y="260640"/>
-            <a:ext cx="8183880" cy="661680"/>
-          </a:xfrm>
-          <a:prstGeom prst="rect">
-            <a:avLst/>
-          </a:prstGeom>
-          <a:noFill/>
-          <a:ln w="0">
-            <a:noFill/>
-          </a:ln>
-        </p:spPr>
-        <p:txBody>
-          <a:bodyPr lIns="0" tIns="0" rIns="0" bIns="0" anchor="b">
-            <a:noAutofit/>
-          </a:bodyPr>
-          <a:lstStyle/>
-          <a:p>
-            <a:pPr>
-              <a:lnSpc>
-                <a:spcPct val="100000"/>
-              </a:lnSpc>
-            </a:pPr>
-            <a:r>
-              <a:rPr lang="de-DE" sz="2200" b="1" strike="noStrike" spc="-1">
-                <a:solidFill>
-                  <a:srgbClr val="5073A5"/>
-                </a:solidFill>
-                <a:latin typeface="Frutiger LT Com 45 Light"/>
-              </a:rPr>
-              <a:t>Folie mit Agenda</a:t>
-            </a:r>
-            <a:endParaRPr lang="de-DE" sz="2200" b="0" strike="noStrike" spc="-1">
-              <a:solidFill>
-                <a:srgbClr val="000000"/>
-              </a:solidFill>
-              <a:latin typeface="Frutiger LT Com 45 Light"/>
-            </a:endParaRPr>
-          </a:p>
-        </p:txBody>
-      </p:sp>
-      <p:sp>
-        <p:nvSpPr>
-          <p:cNvPr id="366" name="TextShape 2"/>
-          <p:cNvSpPr txBox="1"/>
-          <p:nvPr/>
-        </p:nvSpPr>
-        <p:spPr>
-          <a:xfrm>
-            <a:off x="715680" y="1700640"/>
-            <a:ext cx="10803960" cy="4320000"/>
-          </a:xfrm>
-          <a:prstGeom prst="rect">
-            <a:avLst/>
-          </a:prstGeom>
-          <a:noFill/>
-          <a:ln w="0">
-            <a:noFill/>
-          </a:ln>
-        </p:spPr>
-        <p:txBody>
-          <a:bodyPr lIns="0" tIns="0" rIns="0" bIns="0">
-            <a:noAutofit/>
-          </a:bodyPr>
-          <a:lstStyle/>
-          <a:p>
-            <a:endParaRPr lang="de-DE" sz="1700" b="0" strike="noStrike" spc="-1">
-              <a:solidFill>
-                <a:srgbClr val="000000"/>
-              </a:solidFill>
-              <a:latin typeface="Frutiger LT Com 45 Light"/>
-            </a:endParaRPr>
-          </a:p>
-        </p:txBody>
-      </p:sp>
-      <p:sp>
-        <p:nvSpPr>
-          <p:cNvPr id="367" name="TextShape 3"/>
+          <p:cNvPr id="362" name="TextShape 1"/>
           <p:cNvSpPr txBox="1"/>
           <p:nvPr/>
         </p:nvSpPr>
@@ -20889,7 +21344,7 @@
       </p:sp>
       <p:sp>
         <p:nvSpPr>
-          <p:cNvPr id="368" name="TextShape 4"/>
+          <p:cNvPr id="363" name="TextShape 2"/>
           <p:cNvSpPr txBox="1"/>
           <p:nvPr/>
         </p:nvSpPr>
@@ -20917,7 +21372,7 @@
                 <a:spcPct val="100000"/>
               </a:lnSpc>
             </a:pPr>
-            <a:fld id="{564F56BD-C8EE-4DE2-BD40-0964940A191E}" type="slidenum">
+            <a:fld id="{B3AA2393-6CAD-47F5-B2B4-97C89E117396}" type="slidenum">
               <a:rPr lang="de-DE" sz="900" b="1" strike="noStrike" spc="-1">
                 <a:solidFill>
                   <a:srgbClr val="5073A5"/>
@@ -20934,14 +21389,14 @@
       </p:sp>
       <p:sp>
         <p:nvSpPr>
-          <p:cNvPr id="369" name="CustomShape 5"/>
-          <p:cNvSpPr/>
+          <p:cNvPr id="364" name="TextShape 3"/>
+          <p:cNvSpPr txBox="1"/>
           <p:nvPr/>
         </p:nvSpPr>
         <p:spPr>
           <a:xfrm>
-            <a:off x="1032480" y="1087560"/>
-            <a:ext cx="2495520" cy="272880"/>
+            <a:off x="720000" y="260640"/>
+            <a:ext cx="8183880" cy="661680"/>
           </a:xfrm>
           <a:prstGeom prst="rect">
             <a:avLst/>
@@ -20951,135 +21406,9 @@
             <a:noFill/>
           </a:ln>
         </p:spPr>
-        <p:style>
-          <a:lnRef idx="0">
-            <a:scrgbClr r="0" g="0" b="0"/>
-          </a:lnRef>
-          <a:fillRef idx="0">
-            <a:scrgbClr r="0" g="0" b="0"/>
-          </a:fillRef>
-          <a:effectRef idx="0">
-            <a:scrgbClr r="0" g="0" b="0"/>
-          </a:effectRef>
-          <a:fontRef idx="minor"/>
-        </p:style>
-        <p:txBody>
-          <a:bodyPr lIns="90000" tIns="45000" rIns="90000" bIns="45000">
-            <a:spAutoFit/>
-          </a:bodyPr>
-          <a:lstStyle/>
-          <a:p>
-            <a:pPr algn="ctr">
-              <a:lnSpc>
-                <a:spcPct val="100000"/>
-              </a:lnSpc>
-            </a:pPr>
-            <a:r>
-              <a:rPr lang="de-DE" sz="1200" b="0" strike="noStrike" spc="-1">
-                <a:solidFill>
-                  <a:srgbClr val="000000"/>
-                </a:solidFill>
-                <a:latin typeface="Frutiger LT Com 45 Light"/>
-              </a:rPr>
-              <a:t>Thema 1</a:t>
-            </a:r>
-            <a:endParaRPr lang="de-DE" sz="1200" b="0" strike="noStrike" spc="-1">
-              <a:latin typeface="Arial"/>
-            </a:endParaRPr>
-          </a:p>
-        </p:txBody>
-      </p:sp>
-      <p:sp>
-        <p:nvSpPr>
-          <p:cNvPr id="370" name="CustomShape 6"/>
-          <p:cNvSpPr/>
-          <p:nvPr/>
-        </p:nvSpPr>
-        <p:spPr>
-          <a:xfrm>
-            <a:off x="3529080" y="1072080"/>
-            <a:ext cx="1631160" cy="272880"/>
-          </a:xfrm>
-          <a:prstGeom prst="rect">
-            <a:avLst/>
-          </a:prstGeom>
-          <a:noFill/>
-          <a:ln w="0">
-            <a:noFill/>
-          </a:ln>
-        </p:spPr>
-        <p:style>
-          <a:lnRef idx="0">
-            <a:scrgbClr r="0" g="0" b="0"/>
-          </a:lnRef>
-          <a:fillRef idx="0">
-            <a:scrgbClr r="0" g="0" b="0"/>
-          </a:fillRef>
-          <a:effectRef idx="0">
-            <a:scrgbClr r="0" g="0" b="0"/>
-          </a:effectRef>
-          <a:fontRef idx="minor"/>
-        </p:style>
-        <p:txBody>
-          <a:bodyPr lIns="90000" tIns="45000" rIns="90000" bIns="45000">
-            <a:spAutoFit/>
-          </a:bodyPr>
-          <a:lstStyle/>
-          <a:p>
-            <a:pPr algn="ctr">
-              <a:lnSpc>
-                <a:spcPct val="100000"/>
-              </a:lnSpc>
-            </a:pPr>
-            <a:r>
-              <a:rPr lang="de-DE" sz="1200" b="0" strike="noStrike" spc="-1">
-                <a:solidFill>
-                  <a:srgbClr val="B1B3B3"/>
-                </a:solidFill>
-                <a:latin typeface="Frutiger LT Com 45 Light"/>
-              </a:rPr>
-              <a:t>Aspekt 1</a:t>
-            </a:r>
-            <a:endParaRPr lang="de-DE" sz="1200" b="0" strike="noStrike" spc="-1">
-              <a:latin typeface="Arial"/>
-            </a:endParaRPr>
-          </a:p>
-        </p:txBody>
-      </p:sp>
-      <p:sp>
-        <p:nvSpPr>
-          <p:cNvPr id="371" name="CustomShape 7"/>
-          <p:cNvSpPr/>
-          <p:nvPr/>
-        </p:nvSpPr>
-        <p:spPr>
-          <a:xfrm>
-            <a:off x="5313240" y="1087560"/>
-            <a:ext cx="1383840" cy="272880"/>
-          </a:xfrm>
-          <a:prstGeom prst="rect">
-            <a:avLst/>
-          </a:prstGeom>
-          <a:noFill/>
-          <a:ln w="0">
-            <a:noFill/>
-          </a:ln>
-        </p:spPr>
-        <p:style>
-          <a:lnRef idx="0">
-            <a:scrgbClr r="0" g="0" b="0"/>
-          </a:lnRef>
-          <a:fillRef idx="0">
-            <a:scrgbClr r="0" g="0" b="0"/>
-          </a:fillRef>
-          <a:effectRef idx="0">
-            <a:scrgbClr r="0" g="0" b="0"/>
-          </a:effectRef>
-          <a:fontRef idx="minor"/>
-        </p:style>
-        <p:txBody>
-          <a:bodyPr lIns="90000" tIns="45000" rIns="90000" bIns="45000">
-            <a:spAutoFit/>
+        <p:txBody>
+          <a:bodyPr lIns="0" tIns="0" rIns="0" bIns="0" anchor="b">
+            <a:noAutofit/>
           </a:bodyPr>
           <a:lstStyle/>
           <a:p>
@@ -21089,214 +21418,28 @@
               </a:lnSpc>
             </a:pPr>
             <a:r>
-              <a:rPr lang="de-DE" sz="1200" b="0" strike="noStrike" spc="-1">
+              <a:rPr lang="de-DE" sz="2200" b="1" strike="noStrike" spc="-1">
                 <a:solidFill>
-                  <a:srgbClr val="B1B3B3"/>
+                  <a:srgbClr val="5073A5"/>
                 </a:solidFill>
                 <a:latin typeface="Frutiger LT Com 45 Light"/>
               </a:rPr>
-              <a:t>Aspekt 2</a:t>
+              <a:t>Zusammenfassung</a:t>
             </a:r>
-            <a:endParaRPr lang="de-DE" sz="1200" b="0" strike="noStrike" spc="-1">
-              <a:latin typeface="Arial"/>
-            </a:endParaRPr>
-          </a:p>
-        </p:txBody>
-      </p:sp>
-      <p:sp>
-        <p:nvSpPr>
-          <p:cNvPr id="372" name="CustomShape 8"/>
-          <p:cNvSpPr/>
-          <p:nvPr/>
-        </p:nvSpPr>
-        <p:spPr>
-          <a:xfrm>
-            <a:off x="8460000" y="1082880"/>
-            <a:ext cx="2172240" cy="272880"/>
-          </a:xfrm>
-          <a:prstGeom prst="rect">
-            <a:avLst/>
-          </a:prstGeom>
-          <a:noFill/>
-          <a:ln w="0">
-            <a:noFill/>
-          </a:ln>
-        </p:spPr>
-        <p:style>
-          <a:lnRef idx="0">
-            <a:scrgbClr r="0" g="0" b="0"/>
-          </a:lnRef>
-          <a:fillRef idx="0">
-            <a:scrgbClr r="0" g="0" b="0"/>
-          </a:fillRef>
-          <a:effectRef idx="0">
-            <a:scrgbClr r="0" g="0" b="0"/>
-          </a:effectRef>
-          <a:fontRef idx="minor"/>
-        </p:style>
-        <p:txBody>
-          <a:bodyPr lIns="90000" tIns="45000" rIns="90000" bIns="45000">
-            <a:spAutoFit/>
-          </a:bodyPr>
-          <a:lstStyle/>
-          <a:p>
-            <a:pPr algn="ctr">
-              <a:lnSpc>
-                <a:spcPct val="100000"/>
-              </a:lnSpc>
-            </a:pPr>
-            <a:r>
-              <a:rPr lang="de-DE" sz="1200" b="0" strike="noStrike" spc="-1">
-                <a:solidFill>
-                  <a:srgbClr val="B1B3B3"/>
-                </a:solidFill>
-                <a:latin typeface="Frutiger LT Com 45 Light"/>
-              </a:rPr>
-              <a:t>Thema 3</a:t>
-            </a:r>
-            <a:endParaRPr lang="de-DE" sz="1200" b="0" strike="noStrike" spc="-1">
-              <a:latin typeface="Arial"/>
-            </a:endParaRPr>
-          </a:p>
-        </p:txBody>
-      </p:sp>
-      <p:sp>
-        <p:nvSpPr>
-          <p:cNvPr id="373" name="Line 9"/>
-          <p:cNvSpPr/>
-          <p:nvPr/>
-        </p:nvSpPr>
-        <p:spPr>
-          <a:xfrm>
-            <a:off x="1079640" y="1395000"/>
-            <a:ext cx="9840600" cy="0"/>
-          </a:xfrm>
-          <a:prstGeom prst="line">
-            <a:avLst/>
-          </a:prstGeom>
-          <a:ln>
-            <a:solidFill>
-              <a:srgbClr val="000000"/>
-            </a:solidFill>
-            <a:round/>
-          </a:ln>
-        </p:spPr>
-        <p:style>
-          <a:lnRef idx="1">
-            <a:schemeClr val="dk1"/>
-          </a:lnRef>
-          <a:fillRef idx="0">
-            <a:schemeClr val="dk1"/>
-          </a:fillRef>
-          <a:effectRef idx="0">
-            <a:schemeClr val="dk1"/>
-          </a:effectRef>
-          <a:fontRef idx="minor"/>
-        </p:style>
-      </p:sp>
-      <p:sp>
-        <p:nvSpPr>
-          <p:cNvPr id="374" name="CustomShape 10"/>
-          <p:cNvSpPr/>
-          <p:nvPr/>
-        </p:nvSpPr>
-        <p:spPr>
-          <a:xfrm>
-            <a:off x="6876360" y="1072080"/>
-            <a:ext cx="1383840" cy="272880"/>
-          </a:xfrm>
-          <a:prstGeom prst="rect">
-            <a:avLst/>
-          </a:prstGeom>
-          <a:noFill/>
-          <a:ln w="0">
-            <a:noFill/>
-          </a:ln>
-        </p:spPr>
-        <p:style>
-          <a:lnRef idx="0">
-            <a:scrgbClr r="0" g="0" b="0"/>
-          </a:lnRef>
-          <a:fillRef idx="0">
-            <a:scrgbClr r="0" g="0" b="0"/>
-          </a:fillRef>
-          <a:effectRef idx="0">
-            <a:scrgbClr r="0" g="0" b="0"/>
-          </a:effectRef>
-          <a:fontRef idx="minor"/>
-        </p:style>
-        <p:txBody>
-          <a:bodyPr lIns="90000" tIns="45000" rIns="90000" bIns="45000">
-            <a:spAutoFit/>
-          </a:bodyPr>
-          <a:lstStyle/>
-          <a:p>
-            <a:pPr>
-              <a:lnSpc>
-                <a:spcPct val="100000"/>
-              </a:lnSpc>
-            </a:pPr>
-            <a:r>
-              <a:rPr lang="de-DE" sz="1200" b="0" strike="noStrike" spc="-1">
-                <a:solidFill>
-                  <a:srgbClr val="B1B3B3"/>
-                </a:solidFill>
-                <a:latin typeface="Frutiger LT Com 45 Light"/>
-              </a:rPr>
-              <a:t>Aspekt 3</a:t>
-            </a:r>
-            <a:endParaRPr lang="de-DE" sz="1200" b="0" strike="noStrike" spc="-1">
-              <a:latin typeface="Arial"/>
-            </a:endParaRPr>
-          </a:p>
-        </p:txBody>
-      </p:sp>
-      <p:sp>
-        <p:nvSpPr>
-          <p:cNvPr id="375" name="CustomShape 11"/>
-          <p:cNvSpPr/>
-          <p:nvPr/>
-        </p:nvSpPr>
-        <p:spPr>
-          <a:xfrm>
-            <a:off x="1944000" y="1316520"/>
-            <a:ext cx="143640" cy="126000"/>
-          </a:xfrm>
-          <a:prstGeom prst="triangle">
-            <a:avLst>
-              <a:gd name="adj" fmla="val 50000"/>
-            </a:avLst>
-          </a:prstGeom>
-          <a:solidFill>
-            <a:srgbClr val="000000"/>
-          </a:solidFill>
-          <a:ln>
-            <a:noFill/>
-          </a:ln>
-        </p:spPr>
-        <p:style>
-          <a:lnRef idx="2">
-            <a:schemeClr val="dk1">
-              <a:shade val="50000"/>
-            </a:schemeClr>
-          </a:lnRef>
-          <a:fillRef idx="1">
-            <a:schemeClr val="dk1"/>
-          </a:fillRef>
-          <a:effectRef idx="0">
-            <a:schemeClr val="dk1"/>
-          </a:effectRef>
-          <a:fontRef idx="minor"/>
-        </p:style>
+            <a:endParaRPr lang="de-DE" sz="2200" b="0" strike="noStrike" spc="-1">
+              <a:solidFill>
+                <a:srgbClr val="000000"/>
+              </a:solidFill>
+              <a:latin typeface="Frutiger LT Com 45 Light"/>
+            </a:endParaRPr>
+          </a:p>
+        </p:txBody>
       </p:sp>
     </p:spTree>
   </p:cSld>
   <p:clrMapOvr>
     <a:masterClrMapping/>
   </p:clrMapOvr>
-  <p:transition spd="slow">
-    <p:fade/>
-  </p:transition>
 </p:sld>
 </file>
 

</xml_diff>